<commit_message>
recorded narrations for three powerpoints
</commit_message>
<xml_diff>
--- a/PowerPoints/Phase 2 - Overview/007 The History of the Massachusetts APCD.pptx
+++ b/PowerPoints/Phase 2 - Overview/007 The History of the Massachusetts APCD.pptx
@@ -113,6 +113,22 @@
       </a:defRPr>
     </a:lvl9pPr>
   </p:defaultTextStyle>
+  <p:extLst>
+    <p:ext uri="{EFAFB233-063F-42B5-8137-9DF3F51BA10A}">
+      <p15:sldGuideLst xmlns:p15="http://schemas.microsoft.com/office/powerpoint/2012/main">
+        <p15:guide id="1" orient="horz" pos="2160">
+          <p15:clr>
+            <a:srgbClr val="A4A3A4"/>
+          </p15:clr>
+        </p15:guide>
+        <p15:guide id="2" pos="3840">
+          <p15:clr>
+            <a:srgbClr val="A4A3A4"/>
+          </p15:clr>
+        </p15:guide>
+      </p15:sldGuideLst>
+    </p:ext>
+  </p:extLst>
 </p:presentation>
 </file>
 
@@ -198,7 +214,7 @@
           <a:p>
             <a:fld id="{CDF5FA4C-1F4F-4801-9348-143CDC91DFCD}" type="datetimeFigureOut">
               <a:rPr lang="en-US" smtClean="0"/>
-              <a:t>2/23/2016</a:t>
+              <a:t>2/29/2016</a:t>
             </a:fld>
             <a:endParaRPr lang="en-US"/>
           </a:p>
@@ -262,38 +278,37 @@
           <a:p>
             <a:pPr lvl="0"/>
             <a:r>
-              <a:rPr lang="en-US" smtClean="0"/>
+              <a:rPr lang="en-US"/>
               <a:t>Click to edit Master text styles</a:t>
             </a:r>
           </a:p>
           <a:p>
             <a:pPr lvl="1"/>
             <a:r>
-              <a:rPr lang="en-US" smtClean="0"/>
+              <a:rPr lang="en-US"/>
               <a:t>Second level</a:t>
             </a:r>
           </a:p>
           <a:p>
             <a:pPr lvl="2"/>
             <a:r>
-              <a:rPr lang="en-US" smtClean="0"/>
+              <a:rPr lang="en-US"/>
               <a:t>Third level</a:t>
             </a:r>
           </a:p>
           <a:p>
             <a:pPr lvl="3"/>
             <a:r>
-              <a:rPr lang="en-US" smtClean="0"/>
+              <a:rPr lang="en-US"/>
               <a:t>Fourth level</a:t>
             </a:r>
           </a:p>
           <a:p>
             <a:pPr lvl="4"/>
             <a:r>
-              <a:rPr lang="en-US" smtClean="0"/>
+              <a:rPr lang="en-US"/>
               <a:t>Fifth level</a:t>
             </a:r>
-            <a:endParaRPr lang="en-US"/>
           </a:p>
         </p:txBody>
       </p:sp>
@@ -594,7 +609,7 @@
           </a:lstStyle>
           <a:p>
             <a:r>
-              <a:rPr lang="en-US" smtClean="0"/>
+              <a:rPr lang="en-US"/>
               <a:t>Click to edit Master title style</a:t>
             </a:r>
             <a:endParaRPr lang="en-US" dirty="0"/>
@@ -668,7 +683,7 @@
           </a:lstStyle>
           <a:p>
             <a:r>
-              <a:rPr lang="en-US" smtClean="0"/>
+              <a:rPr lang="en-US"/>
               <a:t>Click to edit Master subtitle style</a:t>
             </a:r>
             <a:endParaRPr lang="en-US" dirty="0"/>
@@ -692,7 +707,7 @@
           <a:p>
             <a:fld id="{FF632088-7E42-4B13-8645-6CA4616862AF}" type="datetimeFigureOut">
               <a:rPr lang="en-US" smtClean="0"/>
-              <a:t>2/23/2016</a:t>
+              <a:t>2/29/2016</a:t>
             </a:fld>
             <a:endParaRPr lang="en-US"/>
           </a:p>
@@ -786,10 +801,9 @@
           <a:lstStyle/>
           <a:p>
             <a:r>
-              <a:rPr lang="en-US" smtClean="0"/>
+              <a:rPr lang="en-US"/>
               <a:t>Click to edit Master title style</a:t>
             </a:r>
-            <a:endParaRPr lang="en-US"/>
           </a:p>
         </p:txBody>
       </p:sp>
@@ -810,35 +824,35 @@
           <a:p>
             <a:pPr lvl="0"/>
             <a:r>
-              <a:rPr lang="en-US" smtClean="0"/>
+              <a:rPr lang="en-US"/>
               <a:t>Edit Master text styles</a:t>
             </a:r>
           </a:p>
           <a:p>
             <a:pPr lvl="1"/>
             <a:r>
-              <a:rPr lang="en-US" smtClean="0"/>
+              <a:rPr lang="en-US"/>
               <a:t>Second level</a:t>
             </a:r>
           </a:p>
           <a:p>
             <a:pPr lvl="2"/>
             <a:r>
-              <a:rPr lang="en-US" smtClean="0"/>
+              <a:rPr lang="en-US"/>
               <a:t>Third level</a:t>
             </a:r>
           </a:p>
           <a:p>
             <a:pPr lvl="3"/>
             <a:r>
-              <a:rPr lang="en-US" smtClean="0"/>
+              <a:rPr lang="en-US"/>
               <a:t>Fourth level</a:t>
             </a:r>
           </a:p>
           <a:p>
             <a:pPr lvl="4"/>
             <a:r>
-              <a:rPr lang="en-US" smtClean="0"/>
+              <a:rPr lang="en-US"/>
               <a:t>Fifth level</a:t>
             </a:r>
             <a:endParaRPr lang="en-US" dirty="0"/>
@@ -862,7 +876,7 @@
           <a:p>
             <a:fld id="{FF632088-7E42-4B13-8645-6CA4616862AF}" type="datetimeFigureOut">
               <a:rPr lang="en-US" smtClean="0"/>
-              <a:t>2/23/2016</a:t>
+              <a:t>2/29/2016</a:t>
             </a:fld>
             <a:endParaRPr lang="en-US"/>
           </a:p>
@@ -961,10 +975,9 @@
           <a:lstStyle/>
           <a:p>
             <a:r>
-              <a:rPr lang="en-US" smtClean="0"/>
+              <a:rPr lang="en-US"/>
               <a:t>Click to edit Master title style</a:t>
             </a:r>
-            <a:endParaRPr lang="en-US"/>
           </a:p>
         </p:txBody>
       </p:sp>
@@ -990,38 +1003,37 @@
           <a:p>
             <a:pPr lvl="0"/>
             <a:r>
-              <a:rPr lang="en-US" smtClean="0"/>
+              <a:rPr lang="en-US"/>
               <a:t>Edit Master text styles</a:t>
             </a:r>
           </a:p>
           <a:p>
             <a:pPr lvl="1"/>
             <a:r>
-              <a:rPr lang="en-US" smtClean="0"/>
+              <a:rPr lang="en-US"/>
               <a:t>Second level</a:t>
             </a:r>
           </a:p>
           <a:p>
             <a:pPr lvl="2"/>
             <a:r>
-              <a:rPr lang="en-US" smtClean="0"/>
+              <a:rPr lang="en-US"/>
               <a:t>Third level</a:t>
             </a:r>
           </a:p>
           <a:p>
             <a:pPr lvl="3"/>
             <a:r>
-              <a:rPr lang="en-US" smtClean="0"/>
+              <a:rPr lang="en-US"/>
               <a:t>Fourth level</a:t>
             </a:r>
           </a:p>
           <a:p>
             <a:pPr lvl="4"/>
             <a:r>
-              <a:rPr lang="en-US" smtClean="0"/>
+              <a:rPr lang="en-US"/>
               <a:t>Fifth level</a:t>
             </a:r>
-            <a:endParaRPr lang="en-US"/>
           </a:p>
         </p:txBody>
       </p:sp>
@@ -1042,7 +1054,7 @@
           <a:p>
             <a:fld id="{FF632088-7E42-4B13-8645-6CA4616862AF}" type="datetimeFigureOut">
               <a:rPr lang="en-US" smtClean="0"/>
-              <a:t>2/23/2016</a:t>
+              <a:t>2/29/2016</a:t>
             </a:fld>
             <a:endParaRPr lang="en-US"/>
           </a:p>
@@ -1147,7 +1159,7 @@
           </a:lstStyle>
           <a:p>
             <a:r>
-              <a:rPr lang="en-US" smtClean="0"/>
+              <a:rPr lang="en-US"/>
               <a:t>Click to edit Master title style</a:t>
             </a:r>
             <a:endParaRPr lang="en-US" dirty="0"/>
@@ -1218,7 +1230,7 @@
           </a:lstStyle>
           <a:p>
             <a:r>
-              <a:rPr lang="en-US" smtClean="0"/>
+              <a:rPr lang="en-US"/>
               <a:t>Click to edit Master subtitle style</a:t>
             </a:r>
             <a:endParaRPr lang="en-US" dirty="0"/>
@@ -1242,7 +1254,7 @@
           <a:p>
             <a:fld id="{FF632088-7E42-4B13-8645-6CA4616862AF}" type="datetimeFigureOut">
               <a:rPr lang="en-US" smtClean="0"/>
-              <a:t>2/23/2016</a:t>
+              <a:t>2/29/2016</a:t>
             </a:fld>
             <a:endParaRPr lang="en-US"/>
           </a:p>
@@ -1383,7 +1395,7 @@
           <a:lstStyle/>
           <a:p>
             <a:r>
-              <a:rPr lang="en-US" smtClean="0"/>
+              <a:rPr lang="en-US"/>
               <a:t>Click to edit Master title style</a:t>
             </a:r>
             <a:endParaRPr lang="en-US" dirty="0"/>
@@ -1407,35 +1419,35 @@
           <a:p>
             <a:pPr lvl="0"/>
             <a:r>
-              <a:rPr lang="en-US" smtClean="0"/>
+              <a:rPr lang="en-US"/>
               <a:t>Edit Master text styles</a:t>
             </a:r>
           </a:p>
           <a:p>
             <a:pPr lvl="1"/>
             <a:r>
-              <a:rPr lang="en-US" smtClean="0"/>
+              <a:rPr lang="en-US"/>
               <a:t>Second level</a:t>
             </a:r>
           </a:p>
           <a:p>
             <a:pPr lvl="2"/>
             <a:r>
-              <a:rPr lang="en-US" smtClean="0"/>
+              <a:rPr lang="en-US"/>
               <a:t>Third level</a:t>
             </a:r>
           </a:p>
           <a:p>
             <a:pPr lvl="3"/>
             <a:r>
-              <a:rPr lang="en-US" smtClean="0"/>
+              <a:rPr lang="en-US"/>
               <a:t>Fourth level</a:t>
             </a:r>
           </a:p>
           <a:p>
             <a:pPr lvl="4"/>
             <a:r>
-              <a:rPr lang="en-US" smtClean="0"/>
+              <a:rPr lang="en-US"/>
               <a:t>Fifth level</a:t>
             </a:r>
             <a:endParaRPr lang="en-US" dirty="0"/>
@@ -1459,7 +1471,7 @@
           <a:p>
             <a:fld id="{FF632088-7E42-4B13-8645-6CA4616862AF}" type="datetimeFigureOut">
               <a:rPr lang="en-US" smtClean="0"/>
-              <a:t>2/23/2016</a:t>
+              <a:t>2/29/2016</a:t>
             </a:fld>
             <a:endParaRPr lang="en-US"/>
           </a:p>
@@ -1601,7 +1613,7 @@
           </a:lstStyle>
           <a:p>
             <a:r>
-              <a:rPr lang="en-US" smtClean="0"/>
+              <a:rPr lang="en-US"/>
               <a:t>Click to edit Master title style</a:t>
             </a:r>
             <a:endParaRPr lang="en-US" dirty="0"/>
@@ -1721,7 +1733,7 @@
           <a:p>
             <a:pPr lvl="0"/>
             <a:r>
-              <a:rPr lang="en-US" smtClean="0"/>
+              <a:rPr lang="en-US"/>
               <a:t>Edit Master text styles</a:t>
             </a:r>
           </a:p>
@@ -1744,7 +1756,7 @@
           <a:p>
             <a:fld id="{FF632088-7E42-4B13-8645-6CA4616862AF}" type="datetimeFigureOut">
               <a:rPr lang="en-US" smtClean="0"/>
-              <a:t>2/23/2016</a:t>
+              <a:t>2/29/2016</a:t>
             </a:fld>
             <a:endParaRPr lang="en-US"/>
           </a:p>
@@ -1880,7 +1892,7 @@
           <a:lstStyle/>
           <a:p>
             <a:r>
-              <a:rPr lang="en-US" smtClean="0"/>
+              <a:rPr lang="en-US"/>
               <a:t>Click to edit Master title style</a:t>
             </a:r>
             <a:endParaRPr lang="en-US" dirty="0"/>
@@ -1909,35 +1921,35 @@
           <a:p>
             <a:pPr lvl="0"/>
             <a:r>
-              <a:rPr lang="en-US" smtClean="0"/>
+              <a:rPr lang="en-US"/>
               <a:t>Edit Master text styles</a:t>
             </a:r>
           </a:p>
           <a:p>
             <a:pPr lvl="1"/>
             <a:r>
-              <a:rPr lang="en-US" smtClean="0"/>
+              <a:rPr lang="en-US"/>
               <a:t>Second level</a:t>
             </a:r>
           </a:p>
           <a:p>
             <a:pPr lvl="2"/>
             <a:r>
-              <a:rPr lang="en-US" smtClean="0"/>
+              <a:rPr lang="en-US"/>
               <a:t>Third level</a:t>
             </a:r>
           </a:p>
           <a:p>
             <a:pPr lvl="3"/>
             <a:r>
-              <a:rPr lang="en-US" smtClean="0"/>
+              <a:rPr lang="en-US"/>
               <a:t>Fourth level</a:t>
             </a:r>
           </a:p>
           <a:p>
             <a:pPr lvl="4"/>
             <a:r>
-              <a:rPr lang="en-US" smtClean="0"/>
+              <a:rPr lang="en-US"/>
               <a:t>Fifth level</a:t>
             </a:r>
             <a:endParaRPr lang="en-US" dirty="0"/>
@@ -1966,35 +1978,35 @@
           <a:p>
             <a:pPr lvl="0"/>
             <a:r>
-              <a:rPr lang="en-US" smtClean="0"/>
+              <a:rPr lang="en-US"/>
               <a:t>Edit Master text styles</a:t>
             </a:r>
           </a:p>
           <a:p>
             <a:pPr lvl="1"/>
             <a:r>
-              <a:rPr lang="en-US" smtClean="0"/>
+              <a:rPr lang="en-US"/>
               <a:t>Second level</a:t>
             </a:r>
           </a:p>
           <a:p>
             <a:pPr lvl="2"/>
             <a:r>
-              <a:rPr lang="en-US" smtClean="0"/>
+              <a:rPr lang="en-US"/>
               <a:t>Third level</a:t>
             </a:r>
           </a:p>
           <a:p>
             <a:pPr lvl="3"/>
             <a:r>
-              <a:rPr lang="en-US" smtClean="0"/>
+              <a:rPr lang="en-US"/>
               <a:t>Fourth level</a:t>
             </a:r>
           </a:p>
           <a:p>
             <a:pPr lvl="4"/>
             <a:r>
-              <a:rPr lang="en-US" smtClean="0"/>
+              <a:rPr lang="en-US"/>
               <a:t>Fifth level</a:t>
             </a:r>
             <a:endParaRPr lang="en-US" dirty="0"/>
@@ -2018,7 +2030,7 @@
           <a:p>
             <a:fld id="{FF632088-7E42-4B13-8645-6CA4616862AF}" type="datetimeFigureOut">
               <a:rPr lang="en-US" smtClean="0"/>
-              <a:t>2/23/2016</a:t>
+              <a:t>2/29/2016</a:t>
             </a:fld>
             <a:endParaRPr lang="en-US"/>
           </a:p>
@@ -2115,7 +2127,7 @@
   </p:clrMapOvr>
   <p:extLst>
     <p:ext uri="{DCECCB84-F9BA-43D5-87BE-67443E8EF086}">
-      <p15:sldGuideLst xmlns="" xmlns:p15="http://schemas.microsoft.com/office/powerpoint/2012/main"/>
+      <p15:sldGuideLst xmlns:p15="http://schemas.microsoft.com/office/powerpoint/2012/main"/>
     </p:ext>
   </p:extLst>
 </p:sldLayout>
@@ -2159,7 +2171,7 @@
           <a:lstStyle/>
           <a:p>
             <a:r>
-              <a:rPr lang="en-US" smtClean="0"/>
+              <a:rPr lang="en-US"/>
               <a:t>Click to edit Master title style</a:t>
             </a:r>
             <a:endParaRPr lang="en-US" dirty="0"/>
@@ -2234,7 +2246,7 @@
           <a:p>
             <a:pPr lvl="0"/>
             <a:r>
-              <a:rPr lang="en-US" smtClean="0"/>
+              <a:rPr lang="en-US"/>
               <a:t>Edit Master text styles</a:t>
             </a:r>
           </a:p>
@@ -2262,35 +2274,35 @@
           <a:p>
             <a:pPr lvl="0"/>
             <a:r>
-              <a:rPr lang="en-US" smtClean="0"/>
+              <a:rPr lang="en-US"/>
               <a:t>Edit Master text styles</a:t>
             </a:r>
           </a:p>
           <a:p>
             <a:pPr lvl="1"/>
             <a:r>
-              <a:rPr lang="en-US" smtClean="0"/>
+              <a:rPr lang="en-US"/>
               <a:t>Second level</a:t>
             </a:r>
           </a:p>
           <a:p>
             <a:pPr lvl="2"/>
             <a:r>
-              <a:rPr lang="en-US" smtClean="0"/>
+              <a:rPr lang="en-US"/>
               <a:t>Third level</a:t>
             </a:r>
           </a:p>
           <a:p>
             <a:pPr lvl="3"/>
             <a:r>
-              <a:rPr lang="en-US" smtClean="0"/>
+              <a:rPr lang="en-US"/>
               <a:t>Fourth level</a:t>
             </a:r>
           </a:p>
           <a:p>
             <a:pPr lvl="4"/>
             <a:r>
-              <a:rPr lang="en-US" smtClean="0"/>
+              <a:rPr lang="en-US"/>
               <a:t>Fifth level</a:t>
             </a:r>
             <a:endParaRPr lang="en-US" dirty="0"/>
@@ -2365,7 +2377,7 @@
           <a:p>
             <a:pPr lvl="0"/>
             <a:r>
-              <a:rPr lang="en-US" smtClean="0"/>
+              <a:rPr lang="en-US"/>
               <a:t>Edit Master text styles</a:t>
             </a:r>
           </a:p>
@@ -2393,35 +2405,35 @@
           <a:p>
             <a:pPr lvl="0"/>
             <a:r>
-              <a:rPr lang="en-US" smtClean="0"/>
+              <a:rPr lang="en-US"/>
               <a:t>Edit Master text styles</a:t>
             </a:r>
           </a:p>
           <a:p>
             <a:pPr lvl="1"/>
             <a:r>
-              <a:rPr lang="en-US" smtClean="0"/>
+              <a:rPr lang="en-US"/>
               <a:t>Second level</a:t>
             </a:r>
           </a:p>
           <a:p>
             <a:pPr lvl="2"/>
             <a:r>
-              <a:rPr lang="en-US" smtClean="0"/>
+              <a:rPr lang="en-US"/>
               <a:t>Third level</a:t>
             </a:r>
           </a:p>
           <a:p>
             <a:pPr lvl="3"/>
             <a:r>
-              <a:rPr lang="en-US" smtClean="0"/>
+              <a:rPr lang="en-US"/>
               <a:t>Fourth level</a:t>
             </a:r>
           </a:p>
           <a:p>
             <a:pPr lvl="4"/>
             <a:r>
-              <a:rPr lang="en-US" smtClean="0"/>
+              <a:rPr lang="en-US"/>
               <a:t>Fifth level</a:t>
             </a:r>
             <a:endParaRPr lang="en-US" dirty="0"/>
@@ -2445,7 +2457,7 @@
           <a:p>
             <a:fld id="{FF632088-7E42-4B13-8645-6CA4616862AF}" type="datetimeFigureOut">
               <a:rPr lang="en-US" smtClean="0"/>
-              <a:t>2/23/2016</a:t>
+              <a:t>2/29/2016</a:t>
             </a:fld>
             <a:endParaRPr lang="en-US"/>
           </a:p>
@@ -2542,7 +2554,7 @@
   </p:clrMapOvr>
   <p:extLst>
     <p:ext uri="{DCECCB84-F9BA-43D5-87BE-67443E8EF086}">
-      <p15:sldGuideLst xmlns="" xmlns:p15="http://schemas.microsoft.com/office/powerpoint/2012/main"/>
+      <p15:sldGuideLst xmlns:p15="http://schemas.microsoft.com/office/powerpoint/2012/main"/>
     </p:ext>
   </p:extLst>
 </p:sldLayout>
@@ -2581,7 +2593,7 @@
           <a:lstStyle/>
           <a:p>
             <a:r>
-              <a:rPr lang="en-US" smtClean="0"/>
+              <a:rPr lang="en-US"/>
               <a:t>Click to edit Master title style</a:t>
             </a:r>
             <a:endParaRPr lang="en-US" dirty="0"/>
@@ -2605,7 +2617,7 @@
           <a:p>
             <a:fld id="{FF632088-7E42-4B13-8645-6CA4616862AF}" type="datetimeFigureOut">
               <a:rPr lang="en-US" smtClean="0"/>
-              <a:t>2/23/2016</a:t>
+              <a:t>2/29/2016</a:t>
             </a:fld>
             <a:endParaRPr lang="en-US"/>
           </a:p>
@@ -2737,7 +2749,7 @@
           <a:p>
             <a:fld id="{FF632088-7E42-4B13-8645-6CA4616862AF}" type="datetimeFigureOut">
               <a:rPr lang="en-US" smtClean="0"/>
-              <a:t>2/23/2016</a:t>
+              <a:t>2/29/2016</a:t>
             </a:fld>
             <a:endParaRPr lang="en-US"/>
           </a:p>
@@ -2842,7 +2854,7 @@
           </a:lstStyle>
           <a:p>
             <a:r>
-              <a:rPr lang="en-US" smtClean="0"/>
+              <a:rPr lang="en-US"/>
               <a:t>Click to edit Master title style</a:t>
             </a:r>
             <a:endParaRPr lang="en-US" dirty="0"/>
@@ -2871,35 +2883,35 @@
           <a:p>
             <a:pPr lvl="0"/>
             <a:r>
-              <a:rPr lang="en-US" smtClean="0"/>
+              <a:rPr lang="en-US"/>
               <a:t>Edit Master text styles</a:t>
             </a:r>
           </a:p>
           <a:p>
             <a:pPr lvl="1"/>
             <a:r>
-              <a:rPr lang="en-US" smtClean="0"/>
+              <a:rPr lang="en-US"/>
               <a:t>Second level</a:t>
             </a:r>
           </a:p>
           <a:p>
             <a:pPr lvl="2"/>
             <a:r>
-              <a:rPr lang="en-US" smtClean="0"/>
+              <a:rPr lang="en-US"/>
               <a:t>Third level</a:t>
             </a:r>
           </a:p>
           <a:p>
             <a:pPr lvl="3"/>
             <a:r>
-              <a:rPr lang="en-US" smtClean="0"/>
+              <a:rPr lang="en-US"/>
               <a:t>Fourth level</a:t>
             </a:r>
           </a:p>
           <a:p>
             <a:pPr lvl="4"/>
             <a:r>
-              <a:rPr lang="en-US" smtClean="0"/>
+              <a:rPr lang="en-US"/>
               <a:t>Fifth level</a:t>
             </a:r>
             <a:endParaRPr lang="en-US" dirty="0"/>
@@ -2965,7 +2977,7 @@
           <a:p>
             <a:pPr lvl="0"/>
             <a:r>
-              <a:rPr lang="en-US" smtClean="0"/>
+              <a:rPr lang="en-US"/>
               <a:t>Edit Master text styles</a:t>
             </a:r>
           </a:p>
@@ -2988,7 +3000,7 @@
           <a:p>
             <a:fld id="{FF632088-7E42-4B13-8645-6CA4616862AF}" type="datetimeFigureOut">
               <a:rPr lang="en-US" smtClean="0"/>
-              <a:t>2/23/2016</a:t>
+              <a:t>2/29/2016</a:t>
             </a:fld>
             <a:endParaRPr lang="en-US"/>
           </a:p>
@@ -3085,7 +3097,7 @@
   </p:clrMapOvr>
   <p:extLst>
     <p:ext uri="{DCECCB84-F9BA-43D5-87BE-67443E8EF086}">
-      <p15:sldGuideLst xmlns="" xmlns:p15="http://schemas.microsoft.com/office/powerpoint/2012/main"/>
+      <p15:sldGuideLst xmlns:p15="http://schemas.microsoft.com/office/powerpoint/2012/main"/>
     </p:ext>
   </p:extLst>
 </p:sldLayout>
@@ -3124,7 +3136,7 @@
           <a:lstStyle/>
           <a:p>
             <a:r>
-              <a:rPr lang="en-US" smtClean="0"/>
+              <a:rPr lang="en-US"/>
               <a:t>Click to edit Master title style</a:t>
             </a:r>
             <a:endParaRPr lang="en-US" dirty="0"/>
@@ -3148,35 +3160,35 @@
           <a:p>
             <a:pPr lvl="0"/>
             <a:r>
-              <a:rPr lang="en-US" smtClean="0"/>
+              <a:rPr lang="en-US"/>
               <a:t>Edit Master text styles</a:t>
             </a:r>
           </a:p>
           <a:p>
             <a:pPr lvl="1"/>
             <a:r>
-              <a:rPr lang="en-US" smtClean="0"/>
+              <a:rPr lang="en-US"/>
               <a:t>Second level</a:t>
             </a:r>
           </a:p>
           <a:p>
             <a:pPr lvl="2"/>
             <a:r>
-              <a:rPr lang="en-US" smtClean="0"/>
+              <a:rPr lang="en-US"/>
               <a:t>Third level</a:t>
             </a:r>
           </a:p>
           <a:p>
             <a:pPr lvl="3"/>
             <a:r>
-              <a:rPr lang="en-US" smtClean="0"/>
+              <a:rPr lang="en-US"/>
               <a:t>Fourth level</a:t>
             </a:r>
           </a:p>
           <a:p>
             <a:pPr lvl="4"/>
             <a:r>
-              <a:rPr lang="en-US" smtClean="0"/>
+              <a:rPr lang="en-US"/>
               <a:t>Fifth level</a:t>
             </a:r>
             <a:endParaRPr lang="en-US" dirty="0"/>
@@ -3200,7 +3212,7 @@
           <a:p>
             <a:fld id="{FF632088-7E42-4B13-8645-6CA4616862AF}" type="datetimeFigureOut">
               <a:rPr lang="en-US" smtClean="0"/>
-              <a:t>2/23/2016</a:t>
+              <a:t>2/29/2016</a:t>
             </a:fld>
             <a:endParaRPr lang="en-US"/>
           </a:p>
@@ -3443,7 +3455,7 @@
           </a:lstStyle>
           <a:p>
             <a:r>
-              <a:rPr lang="en-US" smtClean="0"/>
+              <a:rPr lang="en-US"/>
               <a:t>Click to edit Master title style</a:t>
             </a:r>
             <a:endParaRPr lang="en-US" dirty="0"/>
@@ -3518,7 +3530,7 @@
           </a:lstStyle>
           <a:p>
             <a:r>
-              <a:rPr lang="en-US" smtClean="0"/>
+              <a:rPr lang="en-US"/>
               <a:t>Click icon to add picture</a:t>
             </a:r>
             <a:endParaRPr lang="en-US" dirty="0"/>
@@ -3586,7 +3598,7 @@
           <a:p>
             <a:pPr lvl="0"/>
             <a:r>
-              <a:rPr lang="en-US" smtClean="0"/>
+              <a:rPr lang="en-US"/>
               <a:t>Edit Master text styles</a:t>
             </a:r>
           </a:p>
@@ -3618,7 +3630,7 @@
           <a:p>
             <a:fld id="{FF632088-7E42-4B13-8645-6CA4616862AF}" type="datetimeFigureOut">
               <a:rPr lang="en-US" smtClean="0"/>
-              <a:t>2/23/2016</a:t>
+              <a:t>2/29/2016</a:t>
             </a:fld>
             <a:endParaRPr lang="en-US"/>
           </a:p>
@@ -3754,7 +3766,7 @@
           <a:lstStyle/>
           <a:p>
             <a:r>
-              <a:rPr lang="en-US" smtClean="0"/>
+              <a:rPr lang="en-US"/>
               <a:t>Click to edit Master title style</a:t>
             </a:r>
             <a:endParaRPr lang="en-US" dirty="0"/>
@@ -3778,35 +3790,35 @@
           <a:p>
             <a:pPr lvl="0"/>
             <a:r>
-              <a:rPr lang="en-US" smtClean="0"/>
+              <a:rPr lang="en-US"/>
               <a:t>Edit Master text styles</a:t>
             </a:r>
           </a:p>
           <a:p>
             <a:pPr lvl="1"/>
             <a:r>
-              <a:rPr lang="en-US" smtClean="0"/>
+              <a:rPr lang="en-US"/>
               <a:t>Second level</a:t>
             </a:r>
           </a:p>
           <a:p>
             <a:pPr lvl="2"/>
             <a:r>
-              <a:rPr lang="en-US" smtClean="0"/>
+              <a:rPr lang="en-US"/>
               <a:t>Third level</a:t>
             </a:r>
           </a:p>
           <a:p>
             <a:pPr lvl="3"/>
             <a:r>
-              <a:rPr lang="en-US" smtClean="0"/>
+              <a:rPr lang="en-US"/>
               <a:t>Fourth level</a:t>
             </a:r>
           </a:p>
           <a:p>
             <a:pPr lvl="4"/>
             <a:r>
-              <a:rPr lang="en-US" smtClean="0"/>
+              <a:rPr lang="en-US"/>
               <a:t>Fifth level</a:t>
             </a:r>
             <a:endParaRPr lang="en-US" dirty="0"/>
@@ -3830,7 +3842,7 @@
           <a:p>
             <a:fld id="{FF632088-7E42-4B13-8645-6CA4616862AF}" type="datetimeFigureOut">
               <a:rPr lang="en-US" smtClean="0"/>
-              <a:t>2/23/2016</a:t>
+              <a:t>2/29/2016</a:t>
             </a:fld>
             <a:endParaRPr lang="en-US"/>
           </a:p>
@@ -3970,7 +3982,7 @@
           </a:lstStyle>
           <a:p>
             <a:r>
-              <a:rPr lang="en-US" smtClean="0"/>
+              <a:rPr lang="en-US"/>
               <a:t>Click to edit Master title style</a:t>
             </a:r>
             <a:endParaRPr lang="en-US" dirty="0"/>
@@ -3999,35 +4011,35 @@
           <a:p>
             <a:pPr lvl="0"/>
             <a:r>
-              <a:rPr lang="en-US" smtClean="0"/>
+              <a:rPr lang="en-US"/>
               <a:t>Edit Master text styles</a:t>
             </a:r>
           </a:p>
           <a:p>
             <a:pPr lvl="1"/>
             <a:r>
-              <a:rPr lang="en-US" smtClean="0"/>
+              <a:rPr lang="en-US"/>
               <a:t>Second level</a:t>
             </a:r>
           </a:p>
           <a:p>
             <a:pPr lvl="2"/>
             <a:r>
-              <a:rPr lang="en-US" smtClean="0"/>
+              <a:rPr lang="en-US"/>
               <a:t>Third level</a:t>
             </a:r>
           </a:p>
           <a:p>
             <a:pPr lvl="3"/>
             <a:r>
-              <a:rPr lang="en-US" smtClean="0"/>
+              <a:rPr lang="en-US"/>
               <a:t>Fourth level</a:t>
             </a:r>
           </a:p>
           <a:p>
             <a:pPr lvl="4"/>
             <a:r>
-              <a:rPr lang="en-US" smtClean="0"/>
+              <a:rPr lang="en-US"/>
               <a:t>Fifth level</a:t>
             </a:r>
             <a:endParaRPr lang="en-US" dirty="0"/>
@@ -4051,7 +4063,7 @@
           <a:p>
             <a:fld id="{FF632088-7E42-4B13-8645-6CA4616862AF}" type="datetimeFigureOut">
               <a:rPr lang="en-US" smtClean="0"/>
-              <a:t>2/23/2016</a:t>
+              <a:t>2/29/2016</a:t>
             </a:fld>
             <a:endParaRPr lang="en-US"/>
           </a:p>
@@ -4193,7 +4205,7 @@
           </a:lstStyle>
           <a:p>
             <a:r>
-              <a:rPr lang="en-US" smtClean="0"/>
+              <a:rPr lang="en-US"/>
               <a:t>Click to edit Master title style</a:t>
             </a:r>
             <a:endParaRPr lang="en-US" dirty="0"/>
@@ -4316,7 +4328,7 @@
           <a:p>
             <a:pPr lvl="0"/>
             <a:r>
-              <a:rPr lang="en-US" smtClean="0"/>
+              <a:rPr lang="en-US"/>
               <a:t>Edit Master text styles</a:t>
             </a:r>
           </a:p>
@@ -4339,7 +4351,7 @@
           <a:p>
             <a:fld id="{FF632088-7E42-4B13-8645-6CA4616862AF}" type="datetimeFigureOut">
               <a:rPr lang="en-US" smtClean="0"/>
-              <a:t>2/23/2016</a:t>
+              <a:t>2/29/2016</a:t>
             </a:fld>
             <a:endParaRPr lang="en-US"/>
           </a:p>
@@ -4433,7 +4445,7 @@
           <a:lstStyle/>
           <a:p>
             <a:r>
-              <a:rPr lang="en-US" smtClean="0"/>
+              <a:rPr lang="en-US"/>
               <a:t>Click to edit Master title style</a:t>
             </a:r>
             <a:endParaRPr lang="en-US" dirty="0"/>
@@ -4462,35 +4474,35 @@
           <a:p>
             <a:pPr lvl="0"/>
             <a:r>
-              <a:rPr lang="en-US" smtClean="0"/>
+              <a:rPr lang="en-US"/>
               <a:t>Edit Master text styles</a:t>
             </a:r>
           </a:p>
           <a:p>
             <a:pPr lvl="1"/>
             <a:r>
-              <a:rPr lang="en-US" smtClean="0"/>
+              <a:rPr lang="en-US"/>
               <a:t>Second level</a:t>
             </a:r>
           </a:p>
           <a:p>
             <a:pPr lvl="2"/>
             <a:r>
-              <a:rPr lang="en-US" smtClean="0"/>
+              <a:rPr lang="en-US"/>
               <a:t>Third level</a:t>
             </a:r>
           </a:p>
           <a:p>
             <a:pPr lvl="3"/>
             <a:r>
-              <a:rPr lang="en-US" smtClean="0"/>
+              <a:rPr lang="en-US"/>
               <a:t>Fourth level</a:t>
             </a:r>
           </a:p>
           <a:p>
             <a:pPr lvl="4"/>
             <a:r>
-              <a:rPr lang="en-US" smtClean="0"/>
+              <a:rPr lang="en-US"/>
               <a:t>Fifth level</a:t>
             </a:r>
             <a:endParaRPr lang="en-US" dirty="0"/>
@@ -4519,35 +4531,35 @@
           <a:p>
             <a:pPr lvl="0"/>
             <a:r>
-              <a:rPr lang="en-US" smtClean="0"/>
+              <a:rPr lang="en-US"/>
               <a:t>Edit Master text styles</a:t>
             </a:r>
           </a:p>
           <a:p>
             <a:pPr lvl="1"/>
             <a:r>
-              <a:rPr lang="en-US" smtClean="0"/>
+              <a:rPr lang="en-US"/>
               <a:t>Second level</a:t>
             </a:r>
           </a:p>
           <a:p>
             <a:pPr lvl="2"/>
             <a:r>
-              <a:rPr lang="en-US" smtClean="0"/>
+              <a:rPr lang="en-US"/>
               <a:t>Third level</a:t>
             </a:r>
           </a:p>
           <a:p>
             <a:pPr lvl="3"/>
             <a:r>
-              <a:rPr lang="en-US" smtClean="0"/>
+              <a:rPr lang="en-US"/>
               <a:t>Fourth level</a:t>
             </a:r>
           </a:p>
           <a:p>
             <a:pPr lvl="4"/>
             <a:r>
-              <a:rPr lang="en-US" smtClean="0"/>
+              <a:rPr lang="en-US"/>
               <a:t>Fifth level</a:t>
             </a:r>
             <a:endParaRPr lang="en-US" dirty="0"/>
@@ -4571,7 +4583,7 @@
           <a:p>
             <a:fld id="{FF632088-7E42-4B13-8645-6CA4616862AF}" type="datetimeFigureOut">
               <a:rPr lang="en-US" smtClean="0"/>
-              <a:t>2/23/2016</a:t>
+              <a:t>2/29/2016</a:t>
             </a:fld>
             <a:endParaRPr lang="en-US"/>
           </a:p>
@@ -4631,7 +4643,7 @@
   </p:clrMapOvr>
   <p:extLst>
     <p:ext uri="{DCECCB84-F9BA-43D5-87BE-67443E8EF086}">
-      <p15:sldGuideLst xmlns="" xmlns:p15="http://schemas.microsoft.com/office/powerpoint/2012/main"/>
+      <p15:sldGuideLst xmlns:p15="http://schemas.microsoft.com/office/powerpoint/2012/main"/>
     </p:ext>
   </p:extLst>
 </p:sldLayout>
@@ -4718,7 +4730,7 @@
           <a:p>
             <a:pPr lvl="0"/>
             <a:r>
-              <a:rPr lang="en-US" smtClean="0"/>
+              <a:rPr lang="en-US"/>
               <a:t>Edit Master text styles</a:t>
             </a:r>
           </a:p>
@@ -4746,35 +4758,35 @@
           <a:p>
             <a:pPr lvl="0"/>
             <a:r>
-              <a:rPr lang="en-US" smtClean="0"/>
+              <a:rPr lang="en-US"/>
               <a:t>Edit Master text styles</a:t>
             </a:r>
           </a:p>
           <a:p>
             <a:pPr lvl="1"/>
             <a:r>
-              <a:rPr lang="en-US" smtClean="0"/>
+              <a:rPr lang="en-US"/>
               <a:t>Second level</a:t>
             </a:r>
           </a:p>
           <a:p>
             <a:pPr lvl="2"/>
             <a:r>
-              <a:rPr lang="en-US" smtClean="0"/>
+              <a:rPr lang="en-US"/>
               <a:t>Third level</a:t>
             </a:r>
           </a:p>
           <a:p>
             <a:pPr lvl="3"/>
             <a:r>
-              <a:rPr lang="en-US" smtClean="0"/>
+              <a:rPr lang="en-US"/>
               <a:t>Fourth level</a:t>
             </a:r>
           </a:p>
           <a:p>
             <a:pPr lvl="4"/>
             <a:r>
-              <a:rPr lang="en-US" smtClean="0"/>
+              <a:rPr lang="en-US"/>
               <a:t>Fifth level</a:t>
             </a:r>
             <a:endParaRPr lang="en-US" dirty="0"/>
@@ -4843,7 +4855,7 @@
           <a:p>
             <a:pPr lvl="0"/>
             <a:r>
-              <a:rPr lang="en-US" smtClean="0"/>
+              <a:rPr lang="en-US"/>
               <a:t>Edit Master text styles</a:t>
             </a:r>
           </a:p>
@@ -4871,38 +4883,37 @@
           <a:p>
             <a:pPr lvl="0"/>
             <a:r>
-              <a:rPr lang="en-US" smtClean="0"/>
+              <a:rPr lang="en-US"/>
               <a:t>Edit Master text styles</a:t>
             </a:r>
           </a:p>
           <a:p>
             <a:pPr lvl="1"/>
             <a:r>
-              <a:rPr lang="en-US" smtClean="0"/>
+              <a:rPr lang="en-US"/>
               <a:t>Second level</a:t>
             </a:r>
           </a:p>
           <a:p>
             <a:pPr lvl="2"/>
             <a:r>
-              <a:rPr lang="en-US" smtClean="0"/>
+              <a:rPr lang="en-US"/>
               <a:t>Third level</a:t>
             </a:r>
           </a:p>
           <a:p>
             <a:pPr lvl="3"/>
             <a:r>
-              <a:rPr lang="en-US" smtClean="0"/>
+              <a:rPr lang="en-US"/>
               <a:t>Fourth level</a:t>
             </a:r>
           </a:p>
           <a:p>
             <a:pPr lvl="4"/>
             <a:r>
-              <a:rPr lang="en-US" smtClean="0"/>
+              <a:rPr lang="en-US"/>
               <a:t>Fifth level</a:t>
             </a:r>
-            <a:endParaRPr lang="en-US"/>
           </a:p>
         </p:txBody>
       </p:sp>
@@ -4923,7 +4934,7 @@
           <a:p>
             <a:fld id="{FF632088-7E42-4B13-8645-6CA4616862AF}" type="datetimeFigureOut">
               <a:rPr lang="en-US" smtClean="0"/>
-              <a:t>2/23/2016</a:t>
+              <a:t>2/29/2016</a:t>
             </a:fld>
             <a:endParaRPr lang="en-US"/>
           </a:p>
@@ -4987,7 +4998,7 @@
           <a:lstStyle/>
           <a:p>
             <a:r>
-              <a:rPr lang="en-US" smtClean="0"/>
+              <a:rPr lang="en-US"/>
               <a:t>Click to edit Master title style</a:t>
             </a:r>
             <a:endParaRPr lang="en-US" dirty="0"/>
@@ -5006,7 +5017,7 @@
   </p:clrMapOvr>
   <p:extLst>
     <p:ext uri="{DCECCB84-F9BA-43D5-87BE-67443E8EF086}">
-      <p15:sldGuideLst xmlns="" xmlns:p15="http://schemas.microsoft.com/office/powerpoint/2012/main"/>
+      <p15:sldGuideLst xmlns:p15="http://schemas.microsoft.com/office/powerpoint/2012/main"/>
     </p:ext>
   </p:extLst>
 </p:sldLayout>
@@ -5046,7 +5057,7 @@
           <a:p>
             <a:fld id="{FF632088-7E42-4B13-8645-6CA4616862AF}" type="datetimeFigureOut">
               <a:rPr lang="en-US" smtClean="0"/>
-              <a:t>2/23/2016</a:t>
+              <a:t>2/29/2016</a:t>
             </a:fld>
             <a:endParaRPr lang="en-US"/>
           </a:p>
@@ -5110,10 +5121,9 @@
           <a:lstStyle/>
           <a:p>
             <a:r>
-              <a:rPr lang="en-US" smtClean="0"/>
+              <a:rPr lang="en-US"/>
               <a:t>Click to edit Master title style</a:t>
             </a:r>
-            <a:endParaRPr lang="en-US"/>
           </a:p>
         </p:txBody>
       </p:sp>
@@ -5164,7 +5174,7 @@
           <a:p>
             <a:fld id="{FF632088-7E42-4B13-8645-6CA4616862AF}" type="datetimeFigureOut">
               <a:rPr lang="en-US" smtClean="0"/>
-              <a:t>2/23/2016</a:t>
+              <a:t>2/29/2016</a:t>
             </a:fld>
             <a:endParaRPr lang="en-US"/>
           </a:p>
@@ -5269,7 +5279,7 @@
           </a:lstStyle>
           <a:p>
             <a:r>
-              <a:rPr lang="en-US" smtClean="0"/>
+              <a:rPr lang="en-US"/>
               <a:t>Click to edit Master title style</a:t>
             </a:r>
             <a:endParaRPr lang="en-US" dirty="0"/>
@@ -5326,35 +5336,35 @@
           <a:p>
             <a:pPr lvl="0"/>
             <a:r>
-              <a:rPr lang="en-US" smtClean="0"/>
+              <a:rPr lang="en-US"/>
               <a:t>Edit Master text styles</a:t>
             </a:r>
           </a:p>
           <a:p>
             <a:pPr lvl="1"/>
             <a:r>
-              <a:rPr lang="en-US" smtClean="0"/>
+              <a:rPr lang="en-US"/>
               <a:t>Second level</a:t>
             </a:r>
           </a:p>
           <a:p>
             <a:pPr lvl="2"/>
             <a:r>
-              <a:rPr lang="en-US" smtClean="0"/>
+              <a:rPr lang="en-US"/>
               <a:t>Third level</a:t>
             </a:r>
           </a:p>
           <a:p>
             <a:pPr lvl="3"/>
             <a:r>
-              <a:rPr lang="en-US" smtClean="0"/>
+              <a:rPr lang="en-US"/>
               <a:t>Fourth level</a:t>
             </a:r>
           </a:p>
           <a:p>
             <a:pPr lvl="4"/>
             <a:r>
-              <a:rPr lang="en-US" smtClean="0"/>
+              <a:rPr lang="en-US"/>
               <a:t>Fifth level</a:t>
             </a:r>
             <a:endParaRPr lang="en-US" dirty="0"/>
@@ -5425,7 +5435,7 @@
           <a:p>
             <a:pPr lvl="0"/>
             <a:r>
-              <a:rPr lang="en-US" smtClean="0"/>
+              <a:rPr lang="en-US"/>
               <a:t>Edit Master text styles</a:t>
             </a:r>
           </a:p>
@@ -5448,7 +5458,7 @@
           <a:p>
             <a:fld id="{FF632088-7E42-4B13-8645-6CA4616862AF}" type="datetimeFigureOut">
               <a:rPr lang="en-US" smtClean="0"/>
-              <a:t>2/23/2016</a:t>
+              <a:t>2/29/2016</a:t>
             </a:fld>
             <a:endParaRPr lang="en-US"/>
           </a:p>
@@ -5508,7 +5518,7 @@
   </p:clrMapOvr>
   <p:extLst>
     <p:ext uri="{DCECCB84-F9BA-43D5-87BE-67443E8EF086}">
-      <p15:sldGuideLst xmlns="" xmlns:p15="http://schemas.microsoft.com/office/powerpoint/2012/main"/>
+      <p15:sldGuideLst xmlns:p15="http://schemas.microsoft.com/office/powerpoint/2012/main"/>
     </p:ext>
   </p:extLst>
 </p:sldLayout>
@@ -5558,7 +5568,7 @@
           </a:lstStyle>
           <a:p>
             <a:r>
-              <a:rPr lang="en-US" smtClean="0"/>
+              <a:rPr lang="en-US"/>
               <a:t>Click to edit Master title style</a:t>
             </a:r>
             <a:endParaRPr lang="en-US" dirty="0"/>
@@ -5623,7 +5633,7 @@
           </a:lstStyle>
           <a:p>
             <a:r>
-              <a:rPr lang="en-US" smtClean="0"/>
+              <a:rPr lang="en-US"/>
               <a:t>Click icon to add picture</a:t>
             </a:r>
             <a:endParaRPr lang="en-US" dirty="0"/>
@@ -5694,7 +5704,7 @@
           <a:p>
             <a:pPr lvl="0"/>
             <a:r>
-              <a:rPr lang="en-US" smtClean="0"/>
+              <a:rPr lang="en-US"/>
               <a:t>Edit Master text styles</a:t>
             </a:r>
           </a:p>
@@ -5717,7 +5727,7 @@
           <a:p>
             <a:fld id="{FF632088-7E42-4B13-8645-6CA4616862AF}" type="datetimeFigureOut">
               <a:rPr lang="en-US" smtClean="0"/>
-              <a:t>2/23/2016</a:t>
+              <a:t>2/29/2016</a:t>
             </a:fld>
             <a:endParaRPr lang="en-US"/>
           </a:p>
@@ -5826,7 +5836,7 @@
           <a:lstStyle/>
           <a:p>
             <a:r>
-              <a:rPr lang="en-US" smtClean="0"/>
+              <a:rPr lang="en-US"/>
               <a:t>Click to edit Master title style</a:t>
             </a:r>
             <a:endParaRPr lang="en-US" dirty="0"/>
@@ -5860,35 +5870,35 @@
           <a:p>
             <a:pPr lvl="0"/>
             <a:r>
-              <a:rPr lang="en-US" smtClean="0"/>
+              <a:rPr lang="en-US"/>
               <a:t>Edit Master text styles</a:t>
             </a:r>
           </a:p>
           <a:p>
             <a:pPr lvl="1"/>
             <a:r>
-              <a:rPr lang="en-US" smtClean="0"/>
+              <a:rPr lang="en-US"/>
               <a:t>Second level</a:t>
             </a:r>
           </a:p>
           <a:p>
             <a:pPr lvl="2"/>
             <a:r>
-              <a:rPr lang="en-US" smtClean="0"/>
+              <a:rPr lang="en-US"/>
               <a:t>Third level</a:t>
             </a:r>
           </a:p>
           <a:p>
             <a:pPr lvl="3"/>
             <a:r>
-              <a:rPr lang="en-US" smtClean="0"/>
+              <a:rPr lang="en-US"/>
               <a:t>Fourth level</a:t>
             </a:r>
           </a:p>
           <a:p>
             <a:pPr lvl="4"/>
             <a:r>
-              <a:rPr lang="en-US" smtClean="0"/>
+              <a:rPr lang="en-US"/>
               <a:t>Fifth level</a:t>
             </a:r>
             <a:endParaRPr lang="en-US" dirty="0"/>
@@ -5931,7 +5941,7 @@
           <a:p>
             <a:fld id="{FF632088-7E42-4B13-8645-6CA4616862AF}" type="datetimeFigureOut">
               <a:rPr lang="en-US" smtClean="0"/>
-              <a:t>2/23/2016</a:t>
+              <a:t>2/29/2016</a:t>
             </a:fld>
             <a:endParaRPr lang="en-US"/>
           </a:p>
@@ -6307,7 +6317,7 @@
   </p:txStyles>
   <p:extLst>
     <p:ext uri="{27BBF7A9-308A-43DC-89C8-2F10F3537804}">
-      <p15:sldGuideLst xmlns="" xmlns:p15="http://schemas.microsoft.com/office/powerpoint/2012/main"/>
+      <p15:sldGuideLst xmlns:p15="http://schemas.microsoft.com/office/powerpoint/2012/main"/>
     </p:ext>
   </p:extLst>
 </p:sldMaster>
@@ -6433,7 +6443,7 @@
           <a:lstStyle/>
           <a:p>
             <a:r>
-              <a:rPr lang="en-US" smtClean="0"/>
+              <a:rPr lang="en-US"/>
               <a:t>Click to edit Master title style</a:t>
             </a:r>
             <a:endParaRPr lang="en-US" dirty="0"/>
@@ -6536,7 +6546,7 @@
           <a:p>
             <a:fld id="{FF632088-7E42-4B13-8645-6CA4616862AF}" type="datetimeFigureOut">
               <a:rPr lang="en-US" smtClean="0"/>
-              <a:t>2/23/2016</a:t>
+              <a:t>2/29/2016</a:t>
             </a:fld>
             <a:endParaRPr lang="en-US"/>
           </a:p>
@@ -7004,7 +7014,7 @@
   </p:txStyles>
   <p:extLst>
     <p:ext uri="{27BBF7A9-308A-43DC-89C8-2F10F3537804}">
-      <p15:sldGuideLst xmlns="" xmlns:p15="http://schemas.microsoft.com/office/powerpoint/2012/main"/>
+      <p15:sldGuideLst xmlns:p15="http://schemas.microsoft.com/office/powerpoint/2012/main"/>
     </p:ext>
   </p:extLst>
 </p:sldMaster>
@@ -7043,10 +7053,9 @@
           <a:lstStyle/>
           <a:p>
             <a:r>
-              <a:rPr lang="en-US" dirty="0" smtClean="0"/>
+              <a:rPr lang="en-US" dirty="0"/>
               <a:t>The History of the Massachusetts APCD</a:t>
             </a:r>
-            <a:endParaRPr lang="en-US" dirty="0"/>
           </a:p>
         </p:txBody>
       </p:sp>
@@ -7066,13 +7075,45 @@
           <a:lstStyle/>
           <a:p>
             <a:r>
-              <a:rPr lang="en-US" smtClean="0"/>
+              <a:rPr lang="en-US"/>
               <a:t>Spyridon Ganas</a:t>
             </a:r>
-            <a:endParaRPr lang="en-US"/>
-          </a:p>
-        </p:txBody>
-      </p:sp>
+          </a:p>
+        </p:txBody>
+      </p:sp>
+      <p:pic>
+        <p:nvPicPr>
+          <p:cNvPr id="4" name="Audio 3">
+            <a:hlinkClick r:id="" action="ppaction://media"/>
+          </p:cNvPr>
+          <p:cNvPicPr>
+            <a:picLocks noChangeAspect="1"/>
+          </p:cNvPicPr>
+          <p:nvPr>
+            <a:audioFile r:link="rId2"/>
+            <p:extLst>
+              <p:ext uri="{DAA4B4D4-6D71-4841-9C94-3DE7FCFB9230}">
+                <p14:media xmlns:p14="http://schemas.microsoft.com/office/powerpoint/2010/main" r:embed="rId1"/>
+              </p:ext>
+            </p:extLst>
+          </p:nvPr>
+        </p:nvPicPr>
+        <p:blipFill>
+          <a:blip r:embed="rId4"/>
+          <a:stretch>
+            <a:fillRect/>
+          </a:stretch>
+        </p:blipFill>
+        <p:spPr>
+          <a:xfrm>
+            <a:off x="12703216" y="5991828"/>
+            <a:ext cx="609600" cy="609600"/>
+          </a:xfrm>
+          <a:prstGeom prst="rect">
+            <a:avLst/>
+          </a:prstGeom>
+        </p:spPr>
+      </p:pic>
     </p:spTree>
     <p:extLst>
       <p:ext uri="{BB962C8B-B14F-4D97-AF65-F5344CB8AC3E}">
@@ -7083,6 +7124,101 @@
   <p:clrMapOvr>
     <a:masterClrMapping/>
   </p:clrMapOvr>
+  <mc:AlternateContent xmlns:mc="http://schemas.openxmlformats.org/markup-compatibility/2006">
+    <mc:Choice xmlns:p14="http://schemas.microsoft.com/office/powerpoint/2010/main" Requires="p14">
+      <p:transition spd="slow" p14:dur="2000" advTm="6697"/>
+    </mc:Choice>
+    <mc:Fallback>
+      <p:transition spd="slow" advTm="6697"/>
+    </mc:Fallback>
+  </mc:AlternateContent>
+  <p:timing>
+    <p:tnLst>
+      <p:par>
+        <p:cTn id="1" dur="indefinite" restart="never" nodeType="tmRoot">
+          <p:childTnLst>
+            <p:seq concurrent="1" nextAc="seek">
+              <p:cTn id="2" dur="indefinite" nodeType="mainSeq">
+                <p:childTnLst>
+                  <p:par>
+                    <p:cTn id="3" fill="hold">
+                      <p:stCondLst>
+                        <p:cond delay="indefinite"/>
+                        <p:cond evt="onBegin" delay="0">
+                          <p:tn val="2"/>
+                        </p:cond>
+                      </p:stCondLst>
+                      <p:childTnLst>
+                        <p:par>
+                          <p:cTn id="4" fill="hold">
+                            <p:stCondLst>
+                              <p:cond delay="0"/>
+                            </p:stCondLst>
+                            <p:childTnLst>
+                              <p:par>
+                                <p:cTn id="5" presetID="1" presetClass="mediacall" presetSubtype="0" fill="hold" nodeType="afterEffect">
+                                  <p:stCondLst>
+                                    <p:cond delay="0"/>
+                                  </p:stCondLst>
+                                  <p:childTnLst>
+                                    <p:cmd type="call" cmd="playFrom(0.0)">
+                                      <p:cBhvr>
+                                        <p:cTn id="6" dur="1" fill="hold"/>
+                                        <p:tgtEl>
+                                          <p:spTgt spid="4"/>
+                                        </p:tgtEl>
+                                      </p:cBhvr>
+                                    </p:cmd>
+                                  </p:childTnLst>
+                                </p:cTn>
+                              </p:par>
+                            </p:childTnLst>
+                          </p:cTn>
+                        </p:par>
+                      </p:childTnLst>
+                    </p:cTn>
+                  </p:par>
+                </p:childTnLst>
+              </p:cTn>
+              <p:prevCondLst>
+                <p:cond evt="onPrev" delay="0">
+                  <p:tgtEl>
+                    <p:sldTgt/>
+                  </p:tgtEl>
+                </p:cond>
+              </p:prevCondLst>
+              <p:nextCondLst>
+                <p:cond evt="onNext" delay="0">
+                  <p:tgtEl>
+                    <p:sldTgt/>
+                  </p:tgtEl>
+                </p:cond>
+              </p:nextCondLst>
+            </p:seq>
+            <p:audio isNarration="1">
+              <p:cMediaNode vol="80000" showWhenStopped="0">
+                <p:cTn id="7" fill="hold" display="0">
+                  <p:stCondLst>
+                    <p:cond delay="indefinite"/>
+                  </p:stCondLst>
+                  <p:endCondLst>
+                    <p:cond evt="onStopAudio" delay="0">
+                      <p:tgtEl>
+                        <p:sldTgt/>
+                      </p:tgtEl>
+                    </p:cond>
+                  </p:endCondLst>
+                </p:cTn>
+                <p:tgtEl>
+                  <p:spTgt spid="4"/>
+                </p:tgtEl>
+              </p:cMediaNode>
+            </p:audio>
+          </p:childTnLst>
+        </p:cTn>
+      </p:par>
+    </p:tnLst>
+  </p:timing>
 </p:sld>
 </file>
 
@@ -7119,10 +7255,9 @@
           <a:lstStyle/>
           <a:p>
             <a:r>
-              <a:rPr lang="en-US" dirty="0" smtClean="0"/>
+              <a:rPr lang="en-US" dirty="0"/>
               <a:t>In the Beginning…</a:t>
             </a:r>
-            <a:endParaRPr lang="en-US" dirty="0"/>
           </a:p>
         </p:txBody>
       </p:sp>
@@ -7142,31 +7277,63 @@
           <a:lstStyle/>
           <a:p>
             <a:r>
-              <a:rPr lang="en-US" dirty="0" smtClean="0"/>
+              <a:rPr lang="en-US" dirty="0"/>
               <a:t>In 1988, Massachusetts began requiring acute care hospitals to submit patient-level data for inpatient, outpatient and emergency department visits.</a:t>
             </a:r>
           </a:p>
           <a:p>
             <a:r>
-              <a:rPr lang="en-US" dirty="0" smtClean="0"/>
+              <a:rPr lang="en-US" dirty="0"/>
               <a:t>In 2003,  Maine became the first state to aggregate  insurance industry data into an All-Payer Claims Database.</a:t>
             </a:r>
           </a:p>
           <a:p>
             <a:r>
-              <a:rPr lang="en-US" dirty="0" smtClean="0"/>
+              <a:rPr lang="en-US" dirty="0"/>
               <a:t>Five years later, strong interest from many other states led to the creation of the APCD Council.  The council has led efforts to develop national standards for collecting APCD data.</a:t>
             </a:r>
           </a:p>
           <a:p>
             <a:r>
-              <a:rPr lang="en-US" dirty="0" smtClean="0"/>
+              <a:rPr lang="en-US" dirty="0"/>
               <a:t>Today, over 30 states have made some progress toward implementing an APCD.</a:t>
             </a:r>
-            <a:endParaRPr lang="en-US" dirty="0"/>
-          </a:p>
-        </p:txBody>
-      </p:sp>
+          </a:p>
+        </p:txBody>
+      </p:sp>
+      <p:pic>
+        <p:nvPicPr>
+          <p:cNvPr id="4" name="Audio 3">
+            <a:hlinkClick r:id="" action="ppaction://media"/>
+          </p:cNvPr>
+          <p:cNvPicPr>
+            <a:picLocks noChangeAspect="1"/>
+          </p:cNvPicPr>
+          <p:nvPr>
+            <a:audioFile r:link="rId2"/>
+            <p:extLst>
+              <p:ext uri="{DAA4B4D4-6D71-4841-9C94-3DE7FCFB9230}">
+                <p14:media xmlns:p14="http://schemas.microsoft.com/office/powerpoint/2010/main" r:embed="rId1"/>
+              </p:ext>
+            </p:extLst>
+          </p:nvPr>
+        </p:nvPicPr>
+        <p:blipFill>
+          <a:blip r:embed="rId5"/>
+          <a:stretch>
+            <a:fillRect/>
+          </a:stretch>
+        </p:blipFill>
+        <p:spPr>
+          <a:xfrm>
+            <a:off x="12946284" y="6130724"/>
+            <a:ext cx="609600" cy="609600"/>
+          </a:xfrm>
+          <a:prstGeom prst="rect">
+            <a:avLst/>
+          </a:prstGeom>
+        </p:spPr>
+      </p:pic>
     </p:spTree>
     <p:extLst>
       <p:ext uri="{BB962C8B-B14F-4D97-AF65-F5344CB8AC3E}">
@@ -7177,6 +7344,101 @@
   <p:clrMapOvr>
     <a:masterClrMapping/>
   </p:clrMapOvr>
+  <mc:AlternateContent xmlns:mc="http://schemas.openxmlformats.org/markup-compatibility/2006">
+    <mc:Choice xmlns:p14="http://schemas.microsoft.com/office/powerpoint/2010/main" Requires="p14">
+      <p:transition spd="slow" p14:dur="2000" advTm="42589"/>
+    </mc:Choice>
+    <mc:Fallback>
+      <p:transition spd="slow" advTm="42589"/>
+    </mc:Fallback>
+  </mc:AlternateContent>
+  <p:timing>
+    <p:tnLst>
+      <p:par>
+        <p:cTn id="1" dur="indefinite" restart="never" nodeType="tmRoot">
+          <p:childTnLst>
+            <p:seq concurrent="1" nextAc="seek">
+              <p:cTn id="2" dur="indefinite" nodeType="mainSeq">
+                <p:childTnLst>
+                  <p:par>
+                    <p:cTn id="3" fill="hold">
+                      <p:stCondLst>
+                        <p:cond delay="indefinite"/>
+                        <p:cond evt="onBegin" delay="0">
+                          <p:tn val="2"/>
+                        </p:cond>
+                      </p:stCondLst>
+                      <p:childTnLst>
+                        <p:par>
+                          <p:cTn id="4" fill="hold">
+                            <p:stCondLst>
+                              <p:cond delay="0"/>
+                            </p:stCondLst>
+                            <p:childTnLst>
+                              <p:par>
+                                <p:cTn id="5" presetID="1" presetClass="mediacall" presetSubtype="0" fill="hold" nodeType="afterEffect">
+                                  <p:stCondLst>
+                                    <p:cond delay="0"/>
+                                  </p:stCondLst>
+                                  <p:childTnLst>
+                                    <p:cmd type="call" cmd="playFrom(0.0)">
+                                      <p:cBhvr>
+                                        <p:cTn id="6" dur="1" fill="hold"/>
+                                        <p:tgtEl>
+                                          <p:spTgt spid="4"/>
+                                        </p:tgtEl>
+                                      </p:cBhvr>
+                                    </p:cmd>
+                                  </p:childTnLst>
+                                </p:cTn>
+                              </p:par>
+                            </p:childTnLst>
+                          </p:cTn>
+                        </p:par>
+                      </p:childTnLst>
+                    </p:cTn>
+                  </p:par>
+                </p:childTnLst>
+              </p:cTn>
+              <p:prevCondLst>
+                <p:cond evt="onPrev" delay="0">
+                  <p:tgtEl>
+                    <p:sldTgt/>
+                  </p:tgtEl>
+                </p:cond>
+              </p:prevCondLst>
+              <p:nextCondLst>
+                <p:cond evt="onNext" delay="0">
+                  <p:tgtEl>
+                    <p:sldTgt/>
+                  </p:tgtEl>
+                </p:cond>
+              </p:nextCondLst>
+            </p:seq>
+            <p:audio isNarration="1">
+              <p:cMediaNode vol="80000" showWhenStopped="0">
+                <p:cTn id="7" fill="hold" display="0">
+                  <p:stCondLst>
+                    <p:cond delay="indefinite"/>
+                  </p:stCondLst>
+                  <p:endCondLst>
+                    <p:cond evt="onStopAudio" delay="0">
+                      <p:tgtEl>
+                        <p:sldTgt/>
+                      </p:tgtEl>
+                    </p:cond>
+                  </p:endCondLst>
+                </p:cTn>
+                <p:tgtEl>
+                  <p:spTgt spid="4"/>
+                </p:tgtEl>
+              </p:cMediaNode>
+            </p:audio>
+          </p:childTnLst>
+        </p:cTn>
+      </p:par>
+    </p:tnLst>
+  </p:timing>
 </p:sld>
 </file>
 
@@ -7213,10 +7475,9 @@
           <a:lstStyle/>
           <a:p>
             <a:r>
-              <a:rPr lang="en-US" dirty="0" smtClean="0"/>
+              <a:rPr lang="en-US" dirty="0"/>
               <a:t>The Massachusetts APCD</a:t>
             </a:r>
-            <a:endParaRPr lang="en-US" dirty="0"/>
           </a:p>
         </p:txBody>
       </p:sp>
@@ -7243,37 +7504,69 @@
           <a:lstStyle/>
           <a:p>
             <a:r>
-              <a:rPr lang="en-US" dirty="0" smtClean="0"/>
+              <a:rPr lang="en-US" dirty="0"/>
               <a:t>In 2006, the Health Quality and Cost Council was established with the mission of improving health care quality and containing costs.  </a:t>
             </a:r>
           </a:p>
           <a:p>
             <a:r>
-              <a:rPr lang="en-US" dirty="0" smtClean="0"/>
+              <a:rPr lang="en-US" dirty="0"/>
               <a:t>In 2009, the Division of Health Care Finance and Policy began collecting claims data on behalf of the council.</a:t>
             </a:r>
           </a:p>
           <a:p>
             <a:r>
-              <a:rPr lang="en-US" dirty="0" smtClean="0"/>
+              <a:rPr lang="en-US" dirty="0"/>
               <a:t>In September 2009, the project charter for the APCD was approved.</a:t>
             </a:r>
           </a:p>
           <a:p>
             <a:r>
-              <a:rPr lang="en-US" dirty="0" smtClean="0"/>
+              <a:rPr lang="en-US" dirty="0"/>
               <a:t>In November of 2012, the Center for Health Information and Analysis (CHIA) assumed responsibility for the APCD.</a:t>
             </a:r>
           </a:p>
           <a:p>
             <a:r>
-              <a:rPr lang="en-US" dirty="0" smtClean="0"/>
+              <a:rPr lang="en-US" dirty="0"/>
               <a:t>The Massachusetts APCD first became available for users in June 2013.</a:t>
             </a:r>
-            <a:endParaRPr lang="en-US" dirty="0"/>
-          </a:p>
-        </p:txBody>
-      </p:sp>
+          </a:p>
+        </p:txBody>
+      </p:sp>
+      <p:pic>
+        <p:nvPicPr>
+          <p:cNvPr id="4" name="Audio 3">
+            <a:hlinkClick r:id="" action="ppaction://media"/>
+          </p:cNvPr>
+          <p:cNvPicPr>
+            <a:picLocks noChangeAspect="1"/>
+          </p:cNvPicPr>
+          <p:nvPr>
+            <a:audioFile r:link="rId2"/>
+            <p:extLst>
+              <p:ext uri="{DAA4B4D4-6D71-4841-9C94-3DE7FCFB9230}">
+                <p14:media xmlns:p14="http://schemas.microsoft.com/office/powerpoint/2010/main" r:embed="rId1"/>
+              </p:ext>
+            </p:extLst>
+          </p:nvPr>
+        </p:nvPicPr>
+        <p:blipFill>
+          <a:blip r:embed="rId4"/>
+          <a:stretch>
+            <a:fillRect/>
+          </a:stretch>
+        </p:blipFill>
+        <p:spPr>
+          <a:xfrm>
+            <a:off x="13467144" y="6186668"/>
+            <a:ext cx="609600" cy="609600"/>
+          </a:xfrm>
+          <a:prstGeom prst="rect">
+            <a:avLst/>
+          </a:prstGeom>
+        </p:spPr>
+      </p:pic>
     </p:spTree>
     <p:extLst>
       <p:ext uri="{BB962C8B-B14F-4D97-AF65-F5344CB8AC3E}">
@@ -7284,6 +7577,101 @@
   <p:clrMapOvr>
     <a:masterClrMapping/>
   </p:clrMapOvr>
+  <mc:AlternateContent xmlns:mc="http://schemas.openxmlformats.org/markup-compatibility/2006">
+    <mc:Choice xmlns:p14="http://schemas.microsoft.com/office/powerpoint/2010/main" Requires="p14">
+      <p:transition spd="slow" p14:dur="2000" advTm="41696"/>
+    </mc:Choice>
+    <mc:Fallback>
+      <p:transition spd="slow" advTm="41696"/>
+    </mc:Fallback>
+  </mc:AlternateContent>
+  <p:timing>
+    <p:tnLst>
+      <p:par>
+        <p:cTn id="1" dur="indefinite" restart="never" nodeType="tmRoot">
+          <p:childTnLst>
+            <p:seq concurrent="1" nextAc="seek">
+              <p:cTn id="2" dur="indefinite" nodeType="mainSeq">
+                <p:childTnLst>
+                  <p:par>
+                    <p:cTn id="3" fill="hold">
+                      <p:stCondLst>
+                        <p:cond delay="indefinite"/>
+                        <p:cond evt="onBegin" delay="0">
+                          <p:tn val="2"/>
+                        </p:cond>
+                      </p:stCondLst>
+                      <p:childTnLst>
+                        <p:par>
+                          <p:cTn id="4" fill="hold">
+                            <p:stCondLst>
+                              <p:cond delay="0"/>
+                            </p:stCondLst>
+                            <p:childTnLst>
+                              <p:par>
+                                <p:cTn id="5" presetID="1" presetClass="mediacall" presetSubtype="0" fill="hold" nodeType="afterEffect">
+                                  <p:stCondLst>
+                                    <p:cond delay="0"/>
+                                  </p:stCondLst>
+                                  <p:childTnLst>
+                                    <p:cmd type="call" cmd="playFrom(0.0)">
+                                      <p:cBhvr>
+                                        <p:cTn id="6" dur="1" fill="hold"/>
+                                        <p:tgtEl>
+                                          <p:spTgt spid="4"/>
+                                        </p:tgtEl>
+                                      </p:cBhvr>
+                                    </p:cmd>
+                                  </p:childTnLst>
+                                </p:cTn>
+                              </p:par>
+                            </p:childTnLst>
+                          </p:cTn>
+                        </p:par>
+                      </p:childTnLst>
+                    </p:cTn>
+                  </p:par>
+                </p:childTnLst>
+              </p:cTn>
+              <p:prevCondLst>
+                <p:cond evt="onPrev" delay="0">
+                  <p:tgtEl>
+                    <p:sldTgt/>
+                  </p:tgtEl>
+                </p:cond>
+              </p:prevCondLst>
+              <p:nextCondLst>
+                <p:cond evt="onNext" delay="0">
+                  <p:tgtEl>
+                    <p:sldTgt/>
+                  </p:tgtEl>
+                </p:cond>
+              </p:nextCondLst>
+            </p:seq>
+            <p:audio isNarration="1">
+              <p:cMediaNode vol="80000" showWhenStopped="0">
+                <p:cTn id="7" fill="hold" display="0">
+                  <p:stCondLst>
+                    <p:cond delay="indefinite"/>
+                  </p:stCondLst>
+                  <p:endCondLst>
+                    <p:cond evt="onStopAudio" delay="0">
+                      <p:tgtEl>
+                        <p:sldTgt/>
+                      </p:tgtEl>
+                    </p:cond>
+                  </p:endCondLst>
+                </p:cTn>
+                <p:tgtEl>
+                  <p:spTgt spid="4"/>
+                </p:tgtEl>
+              </p:cMediaNode>
+            </p:audio>
+          </p:childTnLst>
+        </p:cTn>
+      </p:par>
+    </p:tnLst>
+  </p:timing>
 </p:sld>
 </file>
 
@@ -7320,10 +7708,9 @@
           <a:lstStyle/>
           <a:p>
             <a:r>
-              <a:rPr lang="en-US" dirty="0" smtClean="0"/>
+              <a:rPr lang="en-US" dirty="0"/>
               <a:t>The MA APCD Charter</a:t>
             </a:r>
-            <a:endParaRPr lang="en-US" dirty="0"/>
           </a:p>
         </p:txBody>
       </p:sp>
@@ -7343,45 +7730,69 @@
           <a:lstStyle/>
           <a:p>
             <a:r>
-              <a:rPr lang="en-US" dirty="0" smtClean="0"/>
+              <a:rPr lang="en-US" dirty="0"/>
               <a:t>Administrative simplification</a:t>
             </a:r>
           </a:p>
           <a:p>
             <a:r>
-              <a:rPr lang="en-US" dirty="0" smtClean="0"/>
+              <a:rPr lang="en-US" dirty="0"/>
               <a:t>Inform public policy</a:t>
             </a:r>
           </a:p>
           <a:p>
             <a:r>
-              <a:rPr lang="en-US" dirty="0" smtClean="0"/>
+              <a:rPr lang="en-US" dirty="0"/>
               <a:t>Support consumers in health care purchase decisions</a:t>
             </a:r>
           </a:p>
           <a:p>
             <a:r>
-              <a:rPr lang="en-US" dirty="0" smtClean="0"/>
-              <a:t>Support case </a:t>
-            </a:r>
-            <a:r>
-              <a:rPr lang="en-US" dirty="0" smtClean="0"/>
-              <a:t>management </a:t>
-            </a:r>
-            <a:r>
-              <a:rPr lang="en-US" dirty="0" smtClean="0"/>
-              <a:t>and care coordination</a:t>
-            </a:r>
-          </a:p>
-          <a:p>
-            <a:r>
-              <a:rPr lang="en-US" dirty="0" smtClean="0"/>
+              <a:rPr lang="en-US" dirty="0"/>
+              <a:t>Support case management and care coordination</a:t>
+            </a:r>
+          </a:p>
+          <a:p>
+            <a:r>
+              <a:rPr lang="en-US" dirty="0"/>
               <a:t>Support healthcare and medical research</a:t>
             </a:r>
-            <a:endParaRPr lang="en-US" dirty="0"/>
-          </a:p>
-        </p:txBody>
-      </p:sp>
+          </a:p>
+        </p:txBody>
+      </p:sp>
+      <p:pic>
+        <p:nvPicPr>
+          <p:cNvPr id="4" name="Audio 3">
+            <a:hlinkClick r:id="" action="ppaction://media"/>
+          </p:cNvPr>
+          <p:cNvPicPr>
+            <a:picLocks noChangeAspect="1"/>
+          </p:cNvPicPr>
+          <p:nvPr>
+            <a:audioFile r:link="rId2"/>
+            <p:extLst>
+              <p:ext uri="{DAA4B4D4-6D71-4841-9C94-3DE7FCFB9230}">
+                <p14:media xmlns:p14="http://schemas.microsoft.com/office/powerpoint/2010/main" r:embed="rId1"/>
+              </p:ext>
+            </p:extLst>
+          </p:nvPr>
+        </p:nvPicPr>
+        <p:blipFill>
+          <a:blip r:embed="rId4"/>
+          <a:stretch>
+            <a:fillRect/>
+          </a:stretch>
+        </p:blipFill>
+        <p:spPr>
+          <a:xfrm>
+            <a:off x="12784238" y="5876081"/>
+            <a:ext cx="609600" cy="609600"/>
+          </a:xfrm>
+          <a:prstGeom prst="rect">
+            <a:avLst/>
+          </a:prstGeom>
+        </p:spPr>
+      </p:pic>
     </p:spTree>
     <p:extLst>
       <p:ext uri="{BB962C8B-B14F-4D97-AF65-F5344CB8AC3E}">
@@ -7392,6 +7803,101 @@
   <p:clrMapOvr>
     <a:masterClrMapping/>
   </p:clrMapOvr>
+  <mc:AlternateContent xmlns:mc="http://schemas.openxmlformats.org/markup-compatibility/2006">
+    <mc:Choice xmlns:p14="http://schemas.microsoft.com/office/powerpoint/2010/main" Requires="p14">
+      <p:transition spd="slow" p14:dur="2000" advTm="24327"/>
+    </mc:Choice>
+    <mc:Fallback>
+      <p:transition spd="slow" advTm="24327"/>
+    </mc:Fallback>
+  </mc:AlternateContent>
+  <p:timing>
+    <p:tnLst>
+      <p:par>
+        <p:cTn id="1" dur="indefinite" restart="never" nodeType="tmRoot">
+          <p:childTnLst>
+            <p:seq concurrent="1" nextAc="seek">
+              <p:cTn id="2" dur="indefinite" nodeType="mainSeq">
+                <p:childTnLst>
+                  <p:par>
+                    <p:cTn id="3" fill="hold">
+                      <p:stCondLst>
+                        <p:cond delay="indefinite"/>
+                        <p:cond evt="onBegin" delay="0">
+                          <p:tn val="2"/>
+                        </p:cond>
+                      </p:stCondLst>
+                      <p:childTnLst>
+                        <p:par>
+                          <p:cTn id="4" fill="hold">
+                            <p:stCondLst>
+                              <p:cond delay="0"/>
+                            </p:stCondLst>
+                            <p:childTnLst>
+                              <p:par>
+                                <p:cTn id="5" presetID="1" presetClass="mediacall" presetSubtype="0" fill="hold" nodeType="afterEffect">
+                                  <p:stCondLst>
+                                    <p:cond delay="0"/>
+                                  </p:stCondLst>
+                                  <p:childTnLst>
+                                    <p:cmd type="call" cmd="playFrom(0.0)">
+                                      <p:cBhvr>
+                                        <p:cTn id="6" dur="1" fill="hold"/>
+                                        <p:tgtEl>
+                                          <p:spTgt spid="4"/>
+                                        </p:tgtEl>
+                                      </p:cBhvr>
+                                    </p:cmd>
+                                  </p:childTnLst>
+                                </p:cTn>
+                              </p:par>
+                            </p:childTnLst>
+                          </p:cTn>
+                        </p:par>
+                      </p:childTnLst>
+                    </p:cTn>
+                  </p:par>
+                </p:childTnLst>
+              </p:cTn>
+              <p:prevCondLst>
+                <p:cond evt="onPrev" delay="0">
+                  <p:tgtEl>
+                    <p:sldTgt/>
+                  </p:tgtEl>
+                </p:cond>
+              </p:prevCondLst>
+              <p:nextCondLst>
+                <p:cond evt="onNext" delay="0">
+                  <p:tgtEl>
+                    <p:sldTgt/>
+                  </p:tgtEl>
+                </p:cond>
+              </p:nextCondLst>
+            </p:seq>
+            <p:audio isNarration="1">
+              <p:cMediaNode vol="80000" showWhenStopped="0">
+                <p:cTn id="7" fill="hold" display="0">
+                  <p:stCondLst>
+                    <p:cond delay="indefinite"/>
+                  </p:stCondLst>
+                  <p:endCondLst>
+                    <p:cond evt="onStopAudio" delay="0">
+                      <p:tgtEl>
+                        <p:sldTgt/>
+                      </p:tgtEl>
+                    </p:cond>
+                  </p:endCondLst>
+                </p:cTn>
+                <p:tgtEl>
+                  <p:spTgt spid="4"/>
+                </p:tgtEl>
+              </p:cMediaNode>
+            </p:audio>
+          </p:childTnLst>
+        </p:cTn>
+      </p:par>
+    </p:tnLst>
+  </p:timing>
 </p:sld>
 </file>
 
@@ -7428,68 +7934,100 @@
           <a:lstStyle/>
           <a:p>
             <a:r>
-              <a:rPr lang="en-US" dirty="0" smtClean="0"/>
+              <a:rPr lang="en-US" dirty="0"/>
               <a:t>The Massachusetts APCD today</a:t>
             </a:r>
+          </a:p>
+        </p:txBody>
+      </p:sp>
+      <p:sp>
+        <p:nvSpPr>
+          <p:cNvPr id="3" name="Content Placeholder 2"/>
+          <p:cNvSpPr>
+            <a:spLocks noGrp="1"/>
+          </p:cNvSpPr>
+          <p:nvPr>
+            <p:ph idx="1"/>
+          </p:nvPr>
+        </p:nvSpPr>
+        <p:spPr/>
+        <p:txBody>
+          <a:bodyPr/>
+          <a:lstStyle/>
+          <a:p>
+            <a:r>
+              <a:rPr lang="en-US" dirty="0"/>
+              <a:t>Contains four years of claims data.  </a:t>
+            </a:r>
+          </a:p>
+          <a:p>
+            <a:r>
+              <a:rPr lang="en-US" dirty="0"/>
+              <a:t>Data is available for over six million Massachusetts residents.</a:t>
+            </a:r>
+          </a:p>
+          <a:p>
+            <a:r>
+              <a:rPr lang="en-US" dirty="0"/>
+              <a:t>Over 900 columns of data are available.</a:t>
+            </a:r>
+          </a:p>
+          <a:p>
+            <a:r>
+              <a:rPr lang="en-US" dirty="0"/>
+              <a:t>The APCD is stored on a high-performance Netezza Data Warehouse appliance.</a:t>
+            </a:r>
+          </a:p>
+          <a:p>
+            <a:r>
+              <a:rPr lang="en-US" dirty="0"/>
+              <a:t>More than 50 research projects have used APCD data.</a:t>
+            </a:r>
+          </a:p>
+          <a:p>
+            <a:r>
+              <a:rPr lang="en-US" dirty="0"/>
+              <a:t>APCD data played a critical role in implementing the ACA’s risk adjustment process.</a:t>
+            </a:r>
+          </a:p>
+          <a:p>
             <a:endParaRPr lang="en-US" dirty="0"/>
           </a:p>
         </p:txBody>
       </p:sp>
-      <p:sp>
-        <p:nvSpPr>
-          <p:cNvPr id="3" name="Content Placeholder 2"/>
-          <p:cNvSpPr>
-            <a:spLocks noGrp="1"/>
-          </p:cNvSpPr>
-          <p:nvPr>
-            <p:ph idx="1"/>
-          </p:nvPr>
-        </p:nvSpPr>
-        <p:spPr/>
-        <p:txBody>
-          <a:bodyPr/>
-          <a:lstStyle/>
-          <a:p>
-            <a:r>
-              <a:rPr lang="en-US" dirty="0" smtClean="0"/>
-              <a:t>Contains four years of claims data.  </a:t>
-            </a:r>
-          </a:p>
-          <a:p>
-            <a:r>
-              <a:rPr lang="en-US" dirty="0" smtClean="0"/>
-              <a:t>Data is available for over six million Massachusetts residents.</a:t>
-            </a:r>
-          </a:p>
-          <a:p>
-            <a:r>
-              <a:rPr lang="en-US" dirty="0" smtClean="0"/>
-              <a:t>Over 900 columns of data are available.</a:t>
-            </a:r>
-          </a:p>
-          <a:p>
-            <a:r>
-              <a:rPr lang="en-US" dirty="0" smtClean="0"/>
-              <a:t>The APCD is stored on a high-performance Netezza Data Warehouse appliance.</a:t>
-            </a:r>
-          </a:p>
-          <a:p>
-            <a:r>
-              <a:rPr lang="en-US" dirty="0" smtClean="0"/>
-              <a:t>More than 50 research projects have used APCD data.</a:t>
-            </a:r>
-          </a:p>
-          <a:p>
-            <a:r>
-              <a:rPr lang="en-US" dirty="0" smtClean="0"/>
-              <a:t>APCD data played a critical role in implementing the ACA’s risk adjustment process.</a:t>
-            </a:r>
-          </a:p>
-          <a:p>
-            <a:endParaRPr lang="en-US" dirty="0"/>
-          </a:p>
-        </p:txBody>
-      </p:sp>
+      <p:pic>
+        <p:nvPicPr>
+          <p:cNvPr id="4" name="Audio 3">
+            <a:hlinkClick r:id="" action="ppaction://media"/>
+          </p:cNvPr>
+          <p:cNvPicPr>
+            <a:picLocks noChangeAspect="1"/>
+          </p:cNvPicPr>
+          <p:nvPr>
+            <a:audioFile r:link="rId2"/>
+            <p:extLst>
+              <p:ext uri="{DAA4B4D4-6D71-4841-9C94-3DE7FCFB9230}">
+                <p14:media xmlns:p14="http://schemas.microsoft.com/office/powerpoint/2010/main" r:embed="rId1"/>
+              </p:ext>
+            </p:extLst>
+          </p:nvPr>
+        </p:nvPicPr>
+        <p:blipFill>
+          <a:blip r:embed="rId4"/>
+          <a:stretch>
+            <a:fillRect/>
+          </a:stretch>
+        </p:blipFill>
+        <p:spPr>
+          <a:xfrm>
+            <a:off x="12483297" y="6130724"/>
+            <a:ext cx="609600" cy="609600"/>
+          </a:xfrm>
+          <a:prstGeom prst="rect">
+            <a:avLst/>
+          </a:prstGeom>
+        </p:spPr>
+      </p:pic>
     </p:spTree>
     <p:extLst>
       <p:ext uri="{BB962C8B-B14F-4D97-AF65-F5344CB8AC3E}">
@@ -7500,6 +8038,101 @@
   <p:clrMapOvr>
     <a:masterClrMapping/>
   </p:clrMapOvr>
+  <mc:AlternateContent xmlns:mc="http://schemas.openxmlformats.org/markup-compatibility/2006">
+    <mc:Choice xmlns:p14="http://schemas.microsoft.com/office/powerpoint/2010/main" Requires="p14">
+      <p:transition spd="slow" p14:dur="2000" advTm="37988"/>
+    </mc:Choice>
+    <mc:Fallback>
+      <p:transition spd="slow" advTm="37988"/>
+    </mc:Fallback>
+  </mc:AlternateContent>
+  <p:timing>
+    <p:tnLst>
+      <p:par>
+        <p:cTn id="1" dur="indefinite" restart="never" nodeType="tmRoot">
+          <p:childTnLst>
+            <p:seq concurrent="1" nextAc="seek">
+              <p:cTn id="2" dur="indefinite" nodeType="mainSeq">
+                <p:childTnLst>
+                  <p:par>
+                    <p:cTn id="3" fill="hold">
+                      <p:stCondLst>
+                        <p:cond delay="indefinite"/>
+                        <p:cond evt="onBegin" delay="0">
+                          <p:tn val="2"/>
+                        </p:cond>
+                      </p:stCondLst>
+                      <p:childTnLst>
+                        <p:par>
+                          <p:cTn id="4" fill="hold">
+                            <p:stCondLst>
+                              <p:cond delay="0"/>
+                            </p:stCondLst>
+                            <p:childTnLst>
+                              <p:par>
+                                <p:cTn id="5" presetID="1" presetClass="mediacall" presetSubtype="0" fill="hold" nodeType="afterEffect">
+                                  <p:stCondLst>
+                                    <p:cond delay="0"/>
+                                  </p:stCondLst>
+                                  <p:childTnLst>
+                                    <p:cmd type="call" cmd="playFrom(0.0)">
+                                      <p:cBhvr>
+                                        <p:cTn id="6" dur="1" fill="hold"/>
+                                        <p:tgtEl>
+                                          <p:spTgt spid="4"/>
+                                        </p:tgtEl>
+                                      </p:cBhvr>
+                                    </p:cmd>
+                                  </p:childTnLst>
+                                </p:cTn>
+                              </p:par>
+                            </p:childTnLst>
+                          </p:cTn>
+                        </p:par>
+                      </p:childTnLst>
+                    </p:cTn>
+                  </p:par>
+                </p:childTnLst>
+              </p:cTn>
+              <p:prevCondLst>
+                <p:cond evt="onPrev" delay="0">
+                  <p:tgtEl>
+                    <p:sldTgt/>
+                  </p:tgtEl>
+                </p:cond>
+              </p:prevCondLst>
+              <p:nextCondLst>
+                <p:cond evt="onNext" delay="0">
+                  <p:tgtEl>
+                    <p:sldTgt/>
+                  </p:tgtEl>
+                </p:cond>
+              </p:nextCondLst>
+            </p:seq>
+            <p:audio isNarration="1">
+              <p:cMediaNode vol="80000" showWhenStopped="0">
+                <p:cTn id="7" fill="hold" display="0">
+                  <p:stCondLst>
+                    <p:cond delay="indefinite"/>
+                  </p:stCondLst>
+                  <p:endCondLst>
+                    <p:cond evt="onStopAudio" delay="0">
+                      <p:tgtEl>
+                        <p:sldTgt/>
+                      </p:tgtEl>
+                    </p:cond>
+                  </p:endCondLst>
+                </p:cTn>
+                <p:tgtEl>
+                  <p:spTgt spid="4"/>
+                </p:tgtEl>
+              </p:cMediaNode>
+            </p:audio>
+          </p:childTnLst>
+        </p:cTn>
+      </p:par>
+    </p:tnLst>
+  </p:timing>
 </p:sld>
 </file>
 
@@ -7536,10 +8169,9 @@
           <a:lstStyle/>
           <a:p>
             <a:r>
-              <a:rPr lang="en-US" dirty="0" smtClean="0"/>
+              <a:rPr lang="en-US" dirty="0"/>
               <a:t>Referenced</a:t>
             </a:r>
-            <a:endParaRPr lang="en-US" dirty="0"/>
           </a:p>
         </p:txBody>
       </p:sp>
@@ -7562,48 +8194,30 @@
               <a:rPr lang="en-US" dirty="0">
                 <a:hlinkClick r:id="rId2"/>
               </a:rPr>
-              <a:t>http://www.chiamass.gov/case-mix-data</a:t>
-            </a:r>
-            <a:r>
-              <a:rPr lang="en-US" dirty="0" smtClean="0">
-                <a:hlinkClick r:id="rId2"/>
-              </a:rPr>
-              <a:t>/</a:t>
-            </a:r>
-            <a:endParaRPr lang="en-US" dirty="0" smtClean="0"/>
+              <a:t>http://www.chiamass.gov/case-mix-data/</a:t>
+            </a:r>
+            <a:endParaRPr lang="en-US" dirty="0"/>
           </a:p>
           <a:p>
             <a:r>
               <a:rPr lang="en-US" dirty="0">
                 <a:hlinkClick r:id="rId3"/>
               </a:rPr>
-              <a:t>https://</a:t>
-            </a:r>
-            <a:r>
-              <a:rPr lang="en-US" dirty="0" smtClean="0">
-                <a:hlinkClick r:id="rId3"/>
-              </a:rPr>
-              <a:t>mhdo.maine.gov/claims.htm</a:t>
-            </a:r>
-            <a:endParaRPr lang="en-US" dirty="0" smtClean="0"/>
+              <a:t>https://mhdo.maine.gov/claims.htm</a:t>
+            </a:r>
+            <a:endParaRPr lang="en-US" dirty="0"/>
           </a:p>
           <a:p>
             <a:r>
               <a:rPr lang="en-US" dirty="0">
                 <a:hlinkClick r:id="rId4"/>
               </a:rPr>
-              <a:t>http://</a:t>
-            </a:r>
-            <a:r>
-              <a:rPr lang="en-US" dirty="0" smtClean="0">
-                <a:hlinkClick r:id="rId4"/>
-              </a:rPr>
-              <a:t>www.chiamass.gov/assets/docs/p/apcd/apcd-overview-2014.pdf</a:t>
-            </a:r>
-            <a:endParaRPr lang="en-US" dirty="0" smtClean="0"/>
-          </a:p>
-          <a:p>
-            <a:endParaRPr lang="en-US" dirty="0" smtClean="0"/>
+              <a:t>http://www.chiamass.gov/assets/docs/p/apcd/apcd-overview-2014.pdf</a:t>
+            </a:r>
+            <a:endParaRPr lang="en-US" dirty="0"/>
+          </a:p>
+          <a:p>
+            <a:endParaRPr lang="en-US" dirty="0"/>
           </a:p>
           <a:p>
             <a:endParaRPr lang="en-US" dirty="0"/>
@@ -7620,6 +8234,14 @@
   <p:clrMapOvr>
     <a:masterClrMapping/>
   </p:clrMapOvr>
+  <mc:AlternateContent xmlns:mc="http://schemas.openxmlformats.org/markup-compatibility/2006">
+    <mc:Choice xmlns:p14="http://schemas.microsoft.com/office/powerpoint/2010/main" Requires="p14">
+      <p:transition spd="slow" p14:dur="2000" advTm="3333"/>
+    </mc:Choice>
+    <mc:Fallback>
+      <p:transition spd="slow" advTm="3333"/>
+    </mc:Fallback>
+  </mc:AlternateContent>
 </p:sld>
 </file>
 
@@ -8123,7 +8745,7 @@
   <a:extraClrSchemeLst/>
   <a:extLst>
     <a:ext uri="{05A4C25C-085E-4340-85A3-A5531E510DB2}">
-      <thm15:themeFamily xmlns="" xmlns:thm15="http://schemas.microsoft.com/office/thememl/2012/main" name="Gallery" id="{BBFCD31E-59A1-489D-B089-A3EAD7CAE12E}" vid="{AC464412-510E-4F2B-8947-A0DDBD028997}"/>
+      <thm15:themeFamily xmlns:thm15="http://schemas.microsoft.com/office/thememl/2012/main" name="Gallery" id="{BBFCD31E-59A1-489D-B089-A3EAD7CAE12E}" vid="{AC464412-510E-4F2B-8947-A0DDBD028997}"/>
     </a:ext>
   </a:extLst>
 </a:theme>

</xml_diff>